<commit_message>
Added visual to dashboard
</commit_message>
<xml_diff>
--- a/Dashboard_Mockup.pptx
+++ b/Dashboard_Mockup.pptx
@@ -8,10 +8,8 @@
     <p:sldId id="256" r:id="rId2"/>
     <p:sldId id="257" r:id="rId3"/>
     <p:sldId id="258" r:id="rId4"/>
-    <p:sldId id="259" r:id="rId5"/>
-    <p:sldId id="260" r:id="rId6"/>
-    <p:sldId id="261" r:id="rId7"/>
-    <p:sldId id="262" r:id="rId8"/>
+    <p:sldId id="261" r:id="rId5"/>
+    <p:sldId id="262" r:id="rId6"/>
   </p:sldIdLst>
   <p:sldSz cx="12192000" cy="6858000"/>
   <p:notesSz cx="6858000" cy="9144000"/>
@@ -274,7 +272,7 @@
           <a:p>
             <a:fld id="{F07CD3FD-BE54-4400-942B-C6C15AA73DFD}" type="datetimeFigureOut">
               <a:rPr lang="en-US" smtClean="0"/>
-              <a:t>5/2/23</a:t>
+              <a:t>5/3/23</a:t>
             </a:fld>
             <a:endParaRPr lang="en-US"/>
           </a:p>
@@ -473,7 +471,7 @@
           <a:p>
             <a:fld id="{F07CD3FD-BE54-4400-942B-C6C15AA73DFD}" type="datetimeFigureOut">
               <a:rPr lang="en-US" smtClean="0"/>
-              <a:t>5/2/23</a:t>
+              <a:t>5/3/23</a:t>
             </a:fld>
             <a:endParaRPr lang="en-US"/>
           </a:p>
@@ -683,7 +681,7 @@
           <a:p>
             <a:fld id="{F07CD3FD-BE54-4400-942B-C6C15AA73DFD}" type="datetimeFigureOut">
               <a:rPr lang="en-US" smtClean="0"/>
-              <a:t>5/2/23</a:t>
+              <a:t>5/3/23</a:t>
             </a:fld>
             <a:endParaRPr lang="en-US"/>
           </a:p>
@@ -881,7 +879,7 @@
           <a:p>
             <a:fld id="{F07CD3FD-BE54-4400-942B-C6C15AA73DFD}" type="datetimeFigureOut">
               <a:rPr lang="en-US" smtClean="0"/>
-              <a:t>5/2/23</a:t>
+              <a:t>5/3/23</a:t>
             </a:fld>
             <a:endParaRPr lang="en-US"/>
           </a:p>
@@ -1161,7 +1159,7 @@
           <a:p>
             <a:fld id="{F07CD3FD-BE54-4400-942B-C6C15AA73DFD}" type="datetimeFigureOut">
               <a:rPr lang="en-US" smtClean="0"/>
-              <a:t>5/2/23</a:t>
+              <a:t>5/3/23</a:t>
             </a:fld>
             <a:endParaRPr lang="en-US"/>
           </a:p>
@@ -1428,7 +1426,7 @@
           <a:p>
             <a:fld id="{F07CD3FD-BE54-4400-942B-C6C15AA73DFD}" type="datetimeFigureOut">
               <a:rPr lang="en-US" smtClean="0"/>
-              <a:t>5/2/23</a:t>
+              <a:t>5/3/23</a:t>
             </a:fld>
             <a:endParaRPr lang="en-US"/>
           </a:p>
@@ -1846,7 +1844,7 @@
           <a:p>
             <a:fld id="{F07CD3FD-BE54-4400-942B-C6C15AA73DFD}" type="datetimeFigureOut">
               <a:rPr lang="en-US" smtClean="0"/>
-              <a:t>5/2/23</a:t>
+              <a:t>5/3/23</a:t>
             </a:fld>
             <a:endParaRPr lang="en-US"/>
           </a:p>
@@ -1988,7 +1986,7 @@
           <a:p>
             <a:fld id="{F07CD3FD-BE54-4400-942B-C6C15AA73DFD}" type="datetimeFigureOut">
               <a:rPr lang="en-US" smtClean="0"/>
-              <a:t>5/2/23</a:t>
+              <a:t>5/3/23</a:t>
             </a:fld>
             <a:endParaRPr lang="en-US"/>
           </a:p>
@@ -2101,7 +2099,7 @@
           <a:p>
             <a:fld id="{F07CD3FD-BE54-4400-942B-C6C15AA73DFD}" type="datetimeFigureOut">
               <a:rPr lang="en-US" smtClean="0"/>
-              <a:t>5/2/23</a:t>
+              <a:t>5/3/23</a:t>
             </a:fld>
             <a:endParaRPr lang="en-US"/>
           </a:p>
@@ -2416,7 +2414,7 @@
           <a:p>
             <a:fld id="{F07CD3FD-BE54-4400-942B-C6C15AA73DFD}" type="datetimeFigureOut">
               <a:rPr lang="en-US" smtClean="0"/>
-              <a:t>5/2/23</a:t>
+              <a:t>5/3/23</a:t>
             </a:fld>
             <a:endParaRPr lang="en-US"/>
           </a:p>
@@ -2708,7 +2706,7 @@
           <a:p>
             <a:fld id="{F07CD3FD-BE54-4400-942B-C6C15AA73DFD}" type="datetimeFigureOut">
               <a:rPr lang="en-US" smtClean="0"/>
-              <a:t>5/2/23</a:t>
+              <a:t>5/3/23</a:t>
             </a:fld>
             <a:endParaRPr lang="en-US"/>
           </a:p>
@@ -2947,7 +2945,7 @@
           <a:p>
             <a:fld id="{F07CD3FD-BE54-4400-942B-C6C15AA73DFD}" type="datetimeFigureOut">
               <a:rPr lang="en-US" smtClean="0"/>
-              <a:t>5/2/23</a:t>
+              <a:t>5/3/23</a:t>
             </a:fld>
             <a:endParaRPr lang="en-US"/>
           </a:p>
@@ -4060,1012 +4058,6 @@
       </p:grpSpPr>
       <p:sp>
         <p:nvSpPr>
-          <p:cNvPr id="2" name="Title 1">
-            <a:extLst>
-              <a:ext uri="{FF2B5EF4-FFF2-40B4-BE49-F238E27FC236}">
-                <a16:creationId xmlns:a16="http://schemas.microsoft.com/office/drawing/2014/main" id="{87951027-7B43-C9AE-3B9C-5F1C7346C299}"/>
-              </a:ext>
-            </a:extLst>
-          </p:cNvPr>
-          <p:cNvSpPr>
-            <a:spLocks noGrp="1"/>
-          </p:cNvSpPr>
-          <p:nvPr>
-            <p:ph type="title"/>
-          </p:nvPr>
-        </p:nvSpPr>
-        <p:spPr/>
-        <p:txBody>
-          <a:bodyPr/>
-          <a:lstStyle/>
-          <a:p>
-            <a:r>
-              <a:rPr lang="en-US" dirty="0"/>
-              <a:t>List of Visuals - *for review*</a:t>
-            </a:r>
-          </a:p>
-        </p:txBody>
-      </p:sp>
-      <p:graphicFrame>
-        <p:nvGraphicFramePr>
-          <p:cNvPr id="4" name="Table 4">
-            <a:extLst>
-              <a:ext uri="{FF2B5EF4-FFF2-40B4-BE49-F238E27FC236}">
-                <a16:creationId xmlns:a16="http://schemas.microsoft.com/office/drawing/2014/main" id="{388B73CB-ECE9-6BF0-E602-27A42220A51A}"/>
-              </a:ext>
-            </a:extLst>
-          </p:cNvPr>
-          <p:cNvGraphicFramePr>
-            <a:graphicFrameLocks noGrp="1"/>
-          </p:cNvGraphicFramePr>
-          <p:nvPr>
-            <p:extLst>
-              <p:ext uri="{D42A27DB-BD31-4B8C-83A1-F6EECF244321}">
-                <p14:modId xmlns:p14="http://schemas.microsoft.com/office/powerpoint/2010/main" val="921892348"/>
-              </p:ext>
-            </p:extLst>
-          </p:nvPr>
-        </p:nvGraphicFramePr>
-        <p:xfrm>
-          <a:off x="1570305" y="2103929"/>
-          <a:ext cx="9051390" cy="3933520"/>
-        </p:xfrm>
-        <a:graphic>
-          <a:graphicData uri="http://schemas.openxmlformats.org/drawingml/2006/table">
-            <a:tbl>
-              <a:tblPr firstRow="1" bandRow="1">
-                <a:tableStyleId>{5C22544A-7EE6-4342-B048-85BDC9FD1C3A}</a:tableStyleId>
-              </a:tblPr>
-              <a:tblGrid>
-                <a:gridCol w="3017130">
-                  <a:extLst>
-                    <a:ext uri="{9D8B030D-6E8A-4147-A177-3AD203B41FA5}">
-                      <a16:colId xmlns:a16="http://schemas.microsoft.com/office/drawing/2014/main" val="475194891"/>
-                    </a:ext>
-                  </a:extLst>
-                </a:gridCol>
-                <a:gridCol w="3017130">
-                  <a:extLst>
-                    <a:ext uri="{9D8B030D-6E8A-4147-A177-3AD203B41FA5}">
-                      <a16:colId xmlns:a16="http://schemas.microsoft.com/office/drawing/2014/main" val="852249217"/>
-                    </a:ext>
-                  </a:extLst>
-                </a:gridCol>
-                <a:gridCol w="3017130">
-                  <a:extLst>
-                    <a:ext uri="{9D8B030D-6E8A-4147-A177-3AD203B41FA5}">
-                      <a16:colId xmlns:a16="http://schemas.microsoft.com/office/drawing/2014/main" val="2710925131"/>
-                    </a:ext>
-                  </a:extLst>
-                </a:gridCol>
-              </a:tblGrid>
-              <a:tr h="428320">
-                <a:tc>
-                  <a:txBody>
-                    <a:bodyPr/>
-                    <a:lstStyle/>
-                    <a:p>
-                      <a:r>
-                        <a:rPr lang="en-US" dirty="0"/>
-                        <a:t>Visual Name</a:t>
-                      </a:r>
-                    </a:p>
-                  </a:txBody>
-                  <a:tcPr/>
-                </a:tc>
-                <a:tc>
-                  <a:txBody>
-                    <a:bodyPr/>
-                    <a:lstStyle/>
-                    <a:p>
-                      <a:r>
-                        <a:rPr lang="en-US" dirty="0"/>
-                        <a:t>Visual Type</a:t>
-                      </a:r>
-                    </a:p>
-                  </a:txBody>
-                  <a:tcPr/>
-                </a:tc>
-                <a:tc>
-                  <a:txBody>
-                    <a:bodyPr/>
-                    <a:lstStyle/>
-                    <a:p>
-                      <a:r>
-                        <a:rPr lang="en-US" dirty="0"/>
-                        <a:t>Tooltips</a:t>
-                      </a:r>
-                    </a:p>
-                  </a:txBody>
-                  <a:tcPr/>
-                </a:tc>
-                <a:extLst>
-                  <a:ext uri="{0D108BD9-81ED-4DB2-BD59-A6C34878D82A}">
-                    <a16:rowId xmlns:a16="http://schemas.microsoft.com/office/drawing/2014/main" val="3008732663"/>
-                  </a:ext>
-                </a:extLst>
-              </a:tr>
-              <a:tr h="370840">
-                <a:tc>
-                  <a:txBody>
-                    <a:bodyPr/>
-                    <a:lstStyle/>
-                    <a:p>
-                      <a:r>
-                        <a:rPr lang="en-US" dirty="0" err="1"/>
-                        <a:t>Nbr</a:t>
-                      </a:r>
-                      <a:r>
-                        <a:rPr lang="en-US" dirty="0"/>
-                        <a:t> of total crimes</a:t>
-                      </a:r>
-                    </a:p>
-                  </a:txBody>
-                  <a:tcPr/>
-                </a:tc>
-                <a:tc>
-                  <a:txBody>
-                    <a:bodyPr/>
-                    <a:lstStyle/>
-                    <a:p>
-                      <a:r>
-                        <a:rPr lang="en-US" dirty="0"/>
-                        <a:t>KPI</a:t>
-                      </a:r>
-                    </a:p>
-                  </a:txBody>
-                  <a:tcPr/>
-                </a:tc>
-                <a:tc>
-                  <a:txBody>
-                    <a:bodyPr/>
-                    <a:lstStyle/>
-                    <a:p>
-                      <a:endParaRPr lang="en-US"/>
-                    </a:p>
-                  </a:txBody>
-                  <a:tcPr/>
-                </a:tc>
-                <a:extLst>
-                  <a:ext uri="{0D108BD9-81ED-4DB2-BD59-A6C34878D82A}">
-                    <a16:rowId xmlns:a16="http://schemas.microsoft.com/office/drawing/2014/main" val="3380278732"/>
-                  </a:ext>
-                </a:extLst>
-              </a:tr>
-              <a:tr h="370840">
-                <a:tc>
-                  <a:txBody>
-                    <a:bodyPr/>
-                    <a:lstStyle/>
-                    <a:p>
-                      <a:r>
-                        <a:rPr lang="en-US" dirty="0"/>
-                        <a:t>Total </a:t>
-                      </a:r>
-                      <a:r>
-                        <a:rPr lang="en-US" dirty="0" err="1"/>
-                        <a:t>nbr</a:t>
-                      </a:r>
-                      <a:r>
-                        <a:rPr lang="en-US" dirty="0"/>
-                        <a:t> of crimes by offence type</a:t>
-                      </a:r>
-                    </a:p>
-                  </a:txBody>
-                  <a:tcPr/>
-                </a:tc>
-                <a:tc>
-                  <a:txBody>
-                    <a:bodyPr/>
-                    <a:lstStyle/>
-                    <a:p>
-                      <a:r>
-                        <a:rPr lang="en-US" dirty="0"/>
-                        <a:t>Pie Chart</a:t>
-                      </a:r>
-                    </a:p>
-                  </a:txBody>
-                  <a:tcPr/>
-                </a:tc>
-                <a:tc>
-                  <a:txBody>
-                    <a:bodyPr/>
-                    <a:lstStyle/>
-                    <a:p>
-                      <a:endParaRPr lang="en-US"/>
-                    </a:p>
-                  </a:txBody>
-                  <a:tcPr/>
-                </a:tc>
-                <a:extLst>
-                  <a:ext uri="{0D108BD9-81ED-4DB2-BD59-A6C34878D82A}">
-                    <a16:rowId xmlns:a16="http://schemas.microsoft.com/office/drawing/2014/main" val="765213376"/>
-                  </a:ext>
-                </a:extLst>
-              </a:tr>
-              <a:tr h="370840">
-                <a:tc>
-                  <a:txBody>
-                    <a:bodyPr/>
-                    <a:lstStyle/>
-                    <a:p>
-                      <a:r>
-                        <a:rPr lang="en-US" dirty="0"/>
-                        <a:t>Offence type</a:t>
-                      </a:r>
-                    </a:p>
-                  </a:txBody>
-                  <a:tcPr/>
-                </a:tc>
-                <a:tc>
-                  <a:txBody>
-                    <a:bodyPr/>
-                    <a:lstStyle/>
-                    <a:p>
-                      <a:r>
-                        <a:rPr lang="en-US" dirty="0"/>
-                        <a:t>Filter</a:t>
-                      </a:r>
-                    </a:p>
-                  </a:txBody>
-                  <a:tcPr/>
-                </a:tc>
-                <a:tc>
-                  <a:txBody>
-                    <a:bodyPr/>
-                    <a:lstStyle/>
-                    <a:p>
-                      <a:endParaRPr lang="en-US" dirty="0"/>
-                    </a:p>
-                  </a:txBody>
-                  <a:tcPr/>
-                </a:tc>
-                <a:extLst>
-                  <a:ext uri="{0D108BD9-81ED-4DB2-BD59-A6C34878D82A}">
-                    <a16:rowId xmlns:a16="http://schemas.microsoft.com/office/drawing/2014/main" val="2167530938"/>
-                  </a:ext>
-                </a:extLst>
-              </a:tr>
-              <a:tr h="370840">
-                <a:tc>
-                  <a:txBody>
-                    <a:bodyPr/>
-                    <a:lstStyle/>
-                    <a:p>
-                      <a:r>
-                        <a:rPr lang="en-US" dirty="0"/>
-                        <a:t>Neighborhood</a:t>
-                      </a:r>
-                    </a:p>
-                  </a:txBody>
-                  <a:tcPr/>
-                </a:tc>
-                <a:tc>
-                  <a:txBody>
-                    <a:bodyPr/>
-                    <a:lstStyle/>
-                    <a:p>
-                      <a:r>
-                        <a:rPr lang="en-US" dirty="0"/>
-                        <a:t>Filter</a:t>
-                      </a:r>
-                    </a:p>
-                  </a:txBody>
-                  <a:tcPr/>
-                </a:tc>
-                <a:tc>
-                  <a:txBody>
-                    <a:bodyPr/>
-                    <a:lstStyle/>
-                    <a:p>
-                      <a:endParaRPr lang="en-US" dirty="0"/>
-                    </a:p>
-                  </a:txBody>
-                  <a:tcPr/>
-                </a:tc>
-                <a:extLst>
-                  <a:ext uri="{0D108BD9-81ED-4DB2-BD59-A6C34878D82A}">
-                    <a16:rowId xmlns:a16="http://schemas.microsoft.com/office/drawing/2014/main" val="1974964964"/>
-                  </a:ext>
-                </a:extLst>
-              </a:tr>
-              <a:tr h="370840">
-                <a:tc>
-                  <a:txBody>
-                    <a:bodyPr/>
-                    <a:lstStyle/>
-                    <a:p>
-                      <a:r>
-                        <a:rPr lang="en-US" dirty="0"/>
-                        <a:t>Date Range</a:t>
-                      </a:r>
-                    </a:p>
-                  </a:txBody>
-                  <a:tcPr/>
-                </a:tc>
-                <a:tc>
-                  <a:txBody>
-                    <a:bodyPr/>
-                    <a:lstStyle/>
-                    <a:p>
-                      <a:r>
-                        <a:rPr lang="en-US" dirty="0"/>
-                        <a:t>Filter</a:t>
-                      </a:r>
-                    </a:p>
-                  </a:txBody>
-                  <a:tcPr/>
-                </a:tc>
-                <a:tc>
-                  <a:txBody>
-                    <a:bodyPr/>
-                    <a:lstStyle/>
-                    <a:p>
-                      <a:endParaRPr lang="en-US" dirty="0"/>
-                    </a:p>
-                  </a:txBody>
-                  <a:tcPr/>
-                </a:tc>
-                <a:extLst>
-                  <a:ext uri="{0D108BD9-81ED-4DB2-BD59-A6C34878D82A}">
-                    <a16:rowId xmlns:a16="http://schemas.microsoft.com/office/drawing/2014/main" val="1726255890"/>
-                  </a:ext>
-                </a:extLst>
-              </a:tr>
-              <a:tr h="370840">
-                <a:tc>
-                  <a:txBody>
-                    <a:bodyPr/>
-                    <a:lstStyle/>
-                    <a:p>
-                      <a:r>
-                        <a:rPr lang="en-US" dirty="0"/>
-                        <a:t>Avg temperature in Toronto</a:t>
-                      </a:r>
-                    </a:p>
-                  </a:txBody>
-                  <a:tcPr/>
-                </a:tc>
-                <a:tc>
-                  <a:txBody>
-                    <a:bodyPr/>
-                    <a:lstStyle/>
-                    <a:p>
-                      <a:r>
-                        <a:rPr lang="en-US" dirty="0"/>
-                        <a:t>KPI</a:t>
-                      </a:r>
-                    </a:p>
-                  </a:txBody>
-                  <a:tcPr/>
-                </a:tc>
-                <a:tc>
-                  <a:txBody>
-                    <a:bodyPr/>
-                    <a:lstStyle/>
-                    <a:p>
-                      <a:endParaRPr lang="en-US" dirty="0"/>
-                    </a:p>
-                  </a:txBody>
-                  <a:tcPr/>
-                </a:tc>
-                <a:extLst>
-                  <a:ext uri="{0D108BD9-81ED-4DB2-BD59-A6C34878D82A}">
-                    <a16:rowId xmlns:a16="http://schemas.microsoft.com/office/drawing/2014/main" val="3257733450"/>
-                  </a:ext>
-                </a:extLst>
-              </a:tr>
-              <a:tr h="370840">
-                <a:tc>
-                  <a:txBody>
-                    <a:bodyPr/>
-                    <a:lstStyle/>
-                    <a:p>
-                      <a:r>
-                        <a:rPr lang="en-US" dirty="0" err="1"/>
-                        <a:t>Nbr</a:t>
-                      </a:r>
-                      <a:r>
-                        <a:rPr lang="en-US" dirty="0"/>
-                        <a:t> of crimes over time</a:t>
-                      </a:r>
-                    </a:p>
-                  </a:txBody>
-                  <a:tcPr/>
-                </a:tc>
-                <a:tc>
-                  <a:txBody>
-                    <a:bodyPr/>
-                    <a:lstStyle/>
-                    <a:p>
-                      <a:r>
-                        <a:rPr lang="en-US" dirty="0"/>
-                        <a:t>Line graph</a:t>
-                      </a:r>
-                    </a:p>
-                  </a:txBody>
-                  <a:tcPr/>
-                </a:tc>
-                <a:tc>
-                  <a:txBody>
-                    <a:bodyPr/>
-                    <a:lstStyle/>
-                    <a:p>
-                      <a:endParaRPr lang="en-US" dirty="0"/>
-                    </a:p>
-                  </a:txBody>
-                  <a:tcPr/>
-                </a:tc>
-                <a:extLst>
-                  <a:ext uri="{0D108BD9-81ED-4DB2-BD59-A6C34878D82A}">
-                    <a16:rowId xmlns:a16="http://schemas.microsoft.com/office/drawing/2014/main" val="102125966"/>
-                  </a:ext>
-                </a:extLst>
-              </a:tr>
-              <a:tr h="370840">
-                <a:tc>
-                  <a:txBody>
-                    <a:bodyPr/>
-                    <a:lstStyle/>
-                    <a:p>
-                      <a:r>
-                        <a:rPr lang="en-US" dirty="0"/>
-                        <a:t>Location of crimes in Toronto</a:t>
-                      </a:r>
-                    </a:p>
-                  </a:txBody>
-                  <a:tcPr/>
-                </a:tc>
-                <a:tc>
-                  <a:txBody>
-                    <a:bodyPr/>
-                    <a:lstStyle/>
-                    <a:p>
-                      <a:r>
-                        <a:rPr lang="en-US" dirty="0"/>
-                        <a:t>Map/heatmap?</a:t>
-                      </a:r>
-                    </a:p>
-                  </a:txBody>
-                  <a:tcPr/>
-                </a:tc>
-                <a:tc>
-                  <a:txBody>
-                    <a:bodyPr/>
-                    <a:lstStyle/>
-                    <a:p>
-                      <a:endParaRPr lang="en-US" dirty="0"/>
-                    </a:p>
-                  </a:txBody>
-                  <a:tcPr/>
-                </a:tc>
-                <a:extLst>
-                  <a:ext uri="{0D108BD9-81ED-4DB2-BD59-A6C34878D82A}">
-                    <a16:rowId xmlns:a16="http://schemas.microsoft.com/office/drawing/2014/main" val="3667334949"/>
-                  </a:ext>
-                </a:extLst>
-              </a:tr>
-            </a:tbl>
-          </a:graphicData>
-        </a:graphic>
-      </p:graphicFrame>
-    </p:spTree>
-    <p:extLst>
-      <p:ext uri="{BB962C8B-B14F-4D97-AF65-F5344CB8AC3E}">
-        <p14:creationId xmlns:p14="http://schemas.microsoft.com/office/powerpoint/2010/main" val="3993197681"/>
-      </p:ext>
-    </p:extLst>
-  </p:cSld>
-  <p:clrMapOvr>
-    <a:masterClrMapping/>
-  </p:clrMapOvr>
-</p:sld>
-</file>
-
-<file path=ppt/slides/slide5.xml><?xml version="1.0" encoding="utf-8"?>
-<p:sld xmlns:a="http://schemas.openxmlformats.org/drawingml/2006/main" xmlns:r="http://schemas.openxmlformats.org/officeDocument/2006/relationships" xmlns:p="http://schemas.openxmlformats.org/presentationml/2006/main">
-  <p:cSld>
-    <p:spTree>
-      <p:nvGrpSpPr>
-        <p:cNvPr id="1" name=""/>
-        <p:cNvGrpSpPr/>
-        <p:nvPr/>
-      </p:nvGrpSpPr>
-      <p:grpSpPr>
-        <a:xfrm>
-          <a:off x="0" y="0"/>
-          <a:ext cx="0" cy="0"/>
-          <a:chOff x="0" y="0"/>
-          <a:chExt cx="0" cy="0"/>
-        </a:xfrm>
-      </p:grpSpPr>
-      <p:sp>
-        <p:nvSpPr>
-          <p:cNvPr id="2" name="Title 1">
-            <a:extLst>
-              <a:ext uri="{FF2B5EF4-FFF2-40B4-BE49-F238E27FC236}">
-                <a16:creationId xmlns:a16="http://schemas.microsoft.com/office/drawing/2014/main" id="{87951027-7B43-C9AE-3B9C-5F1C7346C299}"/>
-              </a:ext>
-            </a:extLst>
-          </p:cNvPr>
-          <p:cNvSpPr>
-            <a:spLocks noGrp="1"/>
-          </p:cNvSpPr>
-          <p:nvPr>
-            <p:ph type="title"/>
-          </p:nvPr>
-        </p:nvSpPr>
-        <p:spPr/>
-        <p:txBody>
-          <a:bodyPr/>
-          <a:lstStyle/>
-          <a:p>
-            <a:r>
-              <a:rPr lang="en-US" dirty="0"/>
-              <a:t>List of Visuals - *for review*</a:t>
-            </a:r>
-          </a:p>
-        </p:txBody>
-      </p:sp>
-      <p:graphicFrame>
-        <p:nvGraphicFramePr>
-          <p:cNvPr id="4" name="Table 4">
-            <a:extLst>
-              <a:ext uri="{FF2B5EF4-FFF2-40B4-BE49-F238E27FC236}">
-                <a16:creationId xmlns:a16="http://schemas.microsoft.com/office/drawing/2014/main" id="{388B73CB-ECE9-6BF0-E602-27A42220A51A}"/>
-              </a:ext>
-            </a:extLst>
-          </p:cNvPr>
-          <p:cNvGraphicFramePr>
-            <a:graphicFrameLocks noGrp="1"/>
-          </p:cNvGraphicFramePr>
-          <p:nvPr>
-            <p:extLst>
-              <p:ext uri="{D42A27DB-BD31-4B8C-83A1-F6EECF244321}">
-                <p14:modId xmlns:p14="http://schemas.microsoft.com/office/powerpoint/2010/main" val="1592691477"/>
-              </p:ext>
-            </p:extLst>
-          </p:nvPr>
-        </p:nvGraphicFramePr>
-        <p:xfrm>
-          <a:off x="1570305" y="2103929"/>
-          <a:ext cx="9051390" cy="3933520"/>
-        </p:xfrm>
-        <a:graphic>
-          <a:graphicData uri="http://schemas.openxmlformats.org/drawingml/2006/table">
-            <a:tbl>
-              <a:tblPr firstRow="1" bandRow="1">
-                <a:tableStyleId>{5C22544A-7EE6-4342-B048-85BDC9FD1C3A}</a:tableStyleId>
-              </a:tblPr>
-              <a:tblGrid>
-                <a:gridCol w="3017130">
-                  <a:extLst>
-                    <a:ext uri="{9D8B030D-6E8A-4147-A177-3AD203B41FA5}">
-                      <a16:colId xmlns:a16="http://schemas.microsoft.com/office/drawing/2014/main" val="475194891"/>
-                    </a:ext>
-                  </a:extLst>
-                </a:gridCol>
-                <a:gridCol w="3017130">
-                  <a:extLst>
-                    <a:ext uri="{9D8B030D-6E8A-4147-A177-3AD203B41FA5}">
-                      <a16:colId xmlns:a16="http://schemas.microsoft.com/office/drawing/2014/main" val="852249217"/>
-                    </a:ext>
-                  </a:extLst>
-                </a:gridCol>
-                <a:gridCol w="3017130">
-                  <a:extLst>
-                    <a:ext uri="{9D8B030D-6E8A-4147-A177-3AD203B41FA5}">
-                      <a16:colId xmlns:a16="http://schemas.microsoft.com/office/drawing/2014/main" val="2710925131"/>
-                    </a:ext>
-                  </a:extLst>
-                </a:gridCol>
-              </a:tblGrid>
-              <a:tr h="428320">
-                <a:tc>
-                  <a:txBody>
-                    <a:bodyPr/>
-                    <a:lstStyle/>
-                    <a:p>
-                      <a:r>
-                        <a:rPr lang="en-US" dirty="0"/>
-                        <a:t>Visual Name</a:t>
-                      </a:r>
-                    </a:p>
-                  </a:txBody>
-                  <a:tcPr/>
-                </a:tc>
-                <a:tc>
-                  <a:txBody>
-                    <a:bodyPr/>
-                    <a:lstStyle/>
-                    <a:p>
-                      <a:r>
-                        <a:rPr lang="en-US" dirty="0"/>
-                        <a:t>Visual Type</a:t>
-                      </a:r>
-                    </a:p>
-                  </a:txBody>
-                  <a:tcPr/>
-                </a:tc>
-                <a:tc>
-                  <a:txBody>
-                    <a:bodyPr/>
-                    <a:lstStyle/>
-                    <a:p>
-                      <a:r>
-                        <a:rPr lang="en-US" dirty="0"/>
-                        <a:t>Tooltips</a:t>
-                      </a:r>
-                    </a:p>
-                  </a:txBody>
-                  <a:tcPr/>
-                </a:tc>
-                <a:extLst>
-                  <a:ext uri="{0D108BD9-81ED-4DB2-BD59-A6C34878D82A}">
-                    <a16:rowId xmlns:a16="http://schemas.microsoft.com/office/drawing/2014/main" val="3008732663"/>
-                  </a:ext>
-                </a:extLst>
-              </a:tr>
-              <a:tr h="370840">
-                <a:tc>
-                  <a:txBody>
-                    <a:bodyPr/>
-                    <a:lstStyle/>
-                    <a:p>
-                      <a:r>
-                        <a:rPr lang="en-US" dirty="0"/>
-                        <a:t>Total </a:t>
-                      </a:r>
-                      <a:r>
-                        <a:rPr lang="en-US" dirty="0" err="1"/>
-                        <a:t>nbr</a:t>
-                      </a:r>
-                      <a:r>
-                        <a:rPr lang="en-US" dirty="0"/>
-                        <a:t> of crimes by location type</a:t>
-                      </a:r>
-                    </a:p>
-                  </a:txBody>
-                  <a:tcPr/>
-                </a:tc>
-                <a:tc>
-                  <a:txBody>
-                    <a:bodyPr/>
-                    <a:lstStyle/>
-                    <a:p>
-                      <a:r>
-                        <a:rPr lang="en-US" dirty="0"/>
-                        <a:t>Pie chart</a:t>
-                      </a:r>
-                    </a:p>
-                  </a:txBody>
-                  <a:tcPr/>
-                </a:tc>
-                <a:tc>
-                  <a:txBody>
-                    <a:bodyPr/>
-                    <a:lstStyle/>
-                    <a:p>
-                      <a:endParaRPr lang="en-US"/>
-                    </a:p>
-                  </a:txBody>
-                  <a:tcPr/>
-                </a:tc>
-                <a:extLst>
-                  <a:ext uri="{0D108BD9-81ED-4DB2-BD59-A6C34878D82A}">
-                    <a16:rowId xmlns:a16="http://schemas.microsoft.com/office/drawing/2014/main" val="3380278732"/>
-                  </a:ext>
-                </a:extLst>
-              </a:tr>
-              <a:tr h="370840">
-                <a:tc>
-                  <a:txBody>
-                    <a:bodyPr/>
-                    <a:lstStyle/>
-                    <a:p>
-                      <a:r>
-                        <a:rPr lang="en-US" dirty="0"/>
-                        <a:t>Total </a:t>
-                      </a:r>
-                      <a:r>
-                        <a:rPr lang="en-US" dirty="0" err="1"/>
-                        <a:t>nbr</a:t>
-                      </a:r>
-                      <a:r>
-                        <a:rPr lang="en-US" dirty="0"/>
-                        <a:t> of crimes by premise type</a:t>
-                      </a:r>
-                    </a:p>
-                  </a:txBody>
-                  <a:tcPr/>
-                </a:tc>
-                <a:tc>
-                  <a:txBody>
-                    <a:bodyPr/>
-                    <a:lstStyle/>
-                    <a:p>
-                      <a:r>
-                        <a:rPr lang="en-US" dirty="0"/>
-                        <a:t>Pie chart</a:t>
-                      </a:r>
-                    </a:p>
-                  </a:txBody>
-                  <a:tcPr/>
-                </a:tc>
-                <a:tc>
-                  <a:txBody>
-                    <a:bodyPr/>
-                    <a:lstStyle/>
-                    <a:p>
-                      <a:endParaRPr lang="en-US"/>
-                    </a:p>
-                  </a:txBody>
-                  <a:tcPr/>
-                </a:tc>
-                <a:extLst>
-                  <a:ext uri="{0D108BD9-81ED-4DB2-BD59-A6C34878D82A}">
-                    <a16:rowId xmlns:a16="http://schemas.microsoft.com/office/drawing/2014/main" val="765213376"/>
-                  </a:ext>
-                </a:extLst>
-              </a:tr>
-              <a:tr h="370840">
-                <a:tc>
-                  <a:txBody>
-                    <a:bodyPr/>
-                    <a:lstStyle/>
-                    <a:p>
-                      <a:endParaRPr lang="en-US" dirty="0"/>
-                    </a:p>
-                  </a:txBody>
-                  <a:tcPr/>
-                </a:tc>
-                <a:tc>
-                  <a:txBody>
-                    <a:bodyPr/>
-                    <a:lstStyle/>
-                    <a:p>
-                      <a:endParaRPr lang="en-US" dirty="0"/>
-                    </a:p>
-                  </a:txBody>
-                  <a:tcPr/>
-                </a:tc>
-                <a:tc>
-                  <a:txBody>
-                    <a:bodyPr/>
-                    <a:lstStyle/>
-                    <a:p>
-                      <a:endParaRPr lang="en-US" dirty="0"/>
-                    </a:p>
-                  </a:txBody>
-                  <a:tcPr/>
-                </a:tc>
-                <a:extLst>
-                  <a:ext uri="{0D108BD9-81ED-4DB2-BD59-A6C34878D82A}">
-                    <a16:rowId xmlns:a16="http://schemas.microsoft.com/office/drawing/2014/main" val="2167530938"/>
-                  </a:ext>
-                </a:extLst>
-              </a:tr>
-              <a:tr h="370840">
-                <a:tc>
-                  <a:txBody>
-                    <a:bodyPr/>
-                    <a:lstStyle/>
-                    <a:p>
-                      <a:endParaRPr lang="en-US" dirty="0"/>
-                    </a:p>
-                  </a:txBody>
-                  <a:tcPr/>
-                </a:tc>
-                <a:tc>
-                  <a:txBody>
-                    <a:bodyPr/>
-                    <a:lstStyle/>
-                    <a:p>
-                      <a:endParaRPr lang="en-US" dirty="0"/>
-                    </a:p>
-                  </a:txBody>
-                  <a:tcPr/>
-                </a:tc>
-                <a:tc>
-                  <a:txBody>
-                    <a:bodyPr/>
-                    <a:lstStyle/>
-                    <a:p>
-                      <a:endParaRPr lang="en-US" dirty="0"/>
-                    </a:p>
-                  </a:txBody>
-                  <a:tcPr/>
-                </a:tc>
-                <a:extLst>
-                  <a:ext uri="{0D108BD9-81ED-4DB2-BD59-A6C34878D82A}">
-                    <a16:rowId xmlns:a16="http://schemas.microsoft.com/office/drawing/2014/main" val="1974964964"/>
-                  </a:ext>
-                </a:extLst>
-              </a:tr>
-              <a:tr h="370840">
-                <a:tc>
-                  <a:txBody>
-                    <a:bodyPr/>
-                    <a:lstStyle/>
-                    <a:p>
-                      <a:endParaRPr lang="en-US" dirty="0"/>
-                    </a:p>
-                  </a:txBody>
-                  <a:tcPr/>
-                </a:tc>
-                <a:tc>
-                  <a:txBody>
-                    <a:bodyPr/>
-                    <a:lstStyle/>
-                    <a:p>
-                      <a:endParaRPr lang="en-US" dirty="0"/>
-                    </a:p>
-                  </a:txBody>
-                  <a:tcPr/>
-                </a:tc>
-                <a:tc>
-                  <a:txBody>
-                    <a:bodyPr/>
-                    <a:lstStyle/>
-                    <a:p>
-                      <a:endParaRPr lang="en-US" dirty="0"/>
-                    </a:p>
-                  </a:txBody>
-                  <a:tcPr/>
-                </a:tc>
-                <a:extLst>
-                  <a:ext uri="{0D108BD9-81ED-4DB2-BD59-A6C34878D82A}">
-                    <a16:rowId xmlns:a16="http://schemas.microsoft.com/office/drawing/2014/main" val="1726255890"/>
-                  </a:ext>
-                </a:extLst>
-              </a:tr>
-              <a:tr h="370840">
-                <a:tc>
-                  <a:txBody>
-                    <a:bodyPr/>
-                    <a:lstStyle/>
-                    <a:p>
-                      <a:endParaRPr lang="en-US" dirty="0"/>
-                    </a:p>
-                  </a:txBody>
-                  <a:tcPr/>
-                </a:tc>
-                <a:tc>
-                  <a:txBody>
-                    <a:bodyPr/>
-                    <a:lstStyle/>
-                    <a:p>
-                      <a:endParaRPr lang="en-US" dirty="0"/>
-                    </a:p>
-                  </a:txBody>
-                  <a:tcPr/>
-                </a:tc>
-                <a:tc>
-                  <a:txBody>
-                    <a:bodyPr/>
-                    <a:lstStyle/>
-                    <a:p>
-                      <a:endParaRPr lang="en-US" dirty="0"/>
-                    </a:p>
-                  </a:txBody>
-                  <a:tcPr/>
-                </a:tc>
-                <a:extLst>
-                  <a:ext uri="{0D108BD9-81ED-4DB2-BD59-A6C34878D82A}">
-                    <a16:rowId xmlns:a16="http://schemas.microsoft.com/office/drawing/2014/main" val="3257733450"/>
-                  </a:ext>
-                </a:extLst>
-              </a:tr>
-              <a:tr h="370840">
-                <a:tc>
-                  <a:txBody>
-                    <a:bodyPr/>
-                    <a:lstStyle/>
-                    <a:p>
-                      <a:endParaRPr lang="en-US" dirty="0"/>
-                    </a:p>
-                  </a:txBody>
-                  <a:tcPr/>
-                </a:tc>
-                <a:tc>
-                  <a:txBody>
-                    <a:bodyPr/>
-                    <a:lstStyle/>
-                    <a:p>
-                      <a:endParaRPr lang="en-US" dirty="0"/>
-                    </a:p>
-                  </a:txBody>
-                  <a:tcPr/>
-                </a:tc>
-                <a:tc>
-                  <a:txBody>
-                    <a:bodyPr/>
-                    <a:lstStyle/>
-                    <a:p>
-                      <a:endParaRPr lang="en-US" dirty="0"/>
-                    </a:p>
-                  </a:txBody>
-                  <a:tcPr/>
-                </a:tc>
-                <a:extLst>
-                  <a:ext uri="{0D108BD9-81ED-4DB2-BD59-A6C34878D82A}">
-                    <a16:rowId xmlns:a16="http://schemas.microsoft.com/office/drawing/2014/main" val="102125966"/>
-                  </a:ext>
-                </a:extLst>
-              </a:tr>
-              <a:tr h="370840">
-                <a:tc>
-                  <a:txBody>
-                    <a:bodyPr/>
-                    <a:lstStyle/>
-                    <a:p>
-                      <a:endParaRPr lang="en-US" dirty="0"/>
-                    </a:p>
-                  </a:txBody>
-                  <a:tcPr/>
-                </a:tc>
-                <a:tc>
-                  <a:txBody>
-                    <a:bodyPr/>
-                    <a:lstStyle/>
-                    <a:p>
-                      <a:endParaRPr lang="en-US" dirty="0"/>
-                    </a:p>
-                  </a:txBody>
-                  <a:tcPr/>
-                </a:tc>
-                <a:tc>
-                  <a:txBody>
-                    <a:bodyPr/>
-                    <a:lstStyle/>
-                    <a:p>
-                      <a:endParaRPr lang="en-US" dirty="0"/>
-                    </a:p>
-                  </a:txBody>
-                  <a:tcPr/>
-                </a:tc>
-                <a:extLst>
-                  <a:ext uri="{0D108BD9-81ED-4DB2-BD59-A6C34878D82A}">
-                    <a16:rowId xmlns:a16="http://schemas.microsoft.com/office/drawing/2014/main" val="3667334949"/>
-                  </a:ext>
-                </a:extLst>
-              </a:tr>
-            </a:tbl>
-          </a:graphicData>
-        </a:graphic>
-      </p:graphicFrame>
-    </p:spTree>
-    <p:extLst>
-      <p:ext uri="{BB962C8B-B14F-4D97-AF65-F5344CB8AC3E}">
-        <p14:creationId xmlns:p14="http://schemas.microsoft.com/office/powerpoint/2010/main" val="2877227856"/>
-      </p:ext>
-    </p:extLst>
-  </p:cSld>
-  <p:clrMapOvr>
-    <a:masterClrMapping/>
-  </p:clrMapOvr>
-</p:sld>
-</file>
-
-<file path=ppt/slides/slide6.xml><?xml version="1.0" encoding="utf-8"?>
-<p:sld xmlns:a="http://schemas.openxmlformats.org/drawingml/2006/main" xmlns:r="http://schemas.openxmlformats.org/officeDocument/2006/relationships" xmlns:p="http://schemas.openxmlformats.org/presentationml/2006/main">
-  <p:cSld>
-    <p:spTree>
-      <p:nvGrpSpPr>
-        <p:cNvPr id="1" name=""/>
-        <p:cNvGrpSpPr/>
-        <p:nvPr/>
-      </p:nvGrpSpPr>
-      <p:grpSpPr>
-        <a:xfrm>
-          <a:off x="0" y="0"/>
-          <a:ext cx="0" cy="0"/>
-          <a:chOff x="0" y="0"/>
-          <a:chExt cx="0" cy="0"/>
-        </a:xfrm>
-      </p:grpSpPr>
-      <p:sp>
-        <p:nvSpPr>
           <p:cNvPr id="7" name="Rectangle 6">
             <a:extLst>
               <a:ext uri="{FF2B5EF4-FFF2-40B4-BE49-F238E27FC236}">
@@ -5488,6 +4480,17 @@
               <a:t>- Total precipitation over Time</a:t>
             </a:r>
           </a:p>
+          <a:p>
+            <a:pPr algn="ctr"/>
+            <a:r>
+              <a:rPr lang="en-US" sz="1050" dirty="0">
+                <a:solidFill>
+                  <a:schemeClr val="tx1"/>
+                </a:solidFill>
+              </a:rPr>
+              <a:t>- Avg temp over Time</a:t>
+            </a:r>
+          </a:p>
         </p:txBody>
       </p:sp>
       <p:sp>
@@ -6144,9 +5147,33 @@
                 <a:solidFill>
                   <a:schemeClr val="tx1"/>
                 </a:solidFill>
+                <a:hlinkClick r:id="rId3"/>
               </a:rPr>
-              <a:t>?</a:t>
-            </a:r>
+              <a:t>Machine learning model visual – enter weather parameters and </a:t>
+            </a:r>
+            <a:r>
+              <a:rPr lang="en-US" sz="1050" dirty="0" err="1">
+                <a:solidFill>
+                  <a:schemeClr val="tx1"/>
+                </a:solidFill>
+                <a:hlinkClick r:id="rId3"/>
+              </a:rPr>
+              <a:t>nbr</a:t>
+            </a:r>
+            <a:r>
+              <a:rPr lang="en-US" sz="1050" dirty="0">
+                <a:solidFill>
+                  <a:schemeClr val="tx1"/>
+                </a:solidFill>
+                <a:hlinkClick r:id="rId3"/>
+              </a:rPr>
+              <a:t> of crimes will be predicted</a:t>
+            </a:r>
+            <a:endParaRPr lang="en-US" sz="1050" dirty="0">
+              <a:solidFill>
+                <a:schemeClr val="tx1"/>
+              </a:solidFill>
+            </a:endParaRPr>
           </a:p>
         </p:txBody>
       </p:sp>
@@ -6202,7 +5229,7 @@
 </p:sld>
 </file>
 
-<file path=ppt/slides/slide7.xml><?xml version="1.0" encoding="utf-8"?>
+<file path=ppt/slides/slide5.xml><?xml version="1.0" encoding="utf-8"?>
 <p:sld xmlns:a="http://schemas.openxmlformats.org/drawingml/2006/main" xmlns:r="http://schemas.openxmlformats.org/officeDocument/2006/relationships" xmlns:p="http://schemas.openxmlformats.org/presentationml/2006/main">
   <p:cSld>
     <p:spTree>
@@ -6270,13 +5297,19 @@
           <a:p>
             <a:r>
               <a:rPr lang="en-US" dirty="0"/>
-              <a:t>Determine if there is an observable relationship between weather features and crime rates</a:t>
+              <a:t>To view summary statistics on crime and weather in Toronto in a dynamic product</a:t>
             </a:r>
           </a:p>
           <a:p>
             <a:r>
               <a:rPr lang="en-US" dirty="0"/>
-              <a:t>View summary statistics on crime and weather in Toronto</a:t>
+              <a:t>To determine if there is an observable relationship between weather features and crime rates</a:t>
+            </a:r>
+          </a:p>
+          <a:p>
+            <a:r>
+              <a:rPr lang="en-US" dirty="0"/>
+              <a:t>To be able to use this dashboard to input weather parameters to predict number of crimes in a day in Toronto</a:t>
             </a:r>
           </a:p>
         </p:txBody>

</xml_diff>